<commit_message>
Updated Presentations and Android Projects
This commit also contains Eclipse Android projects if you are using
Eclipse Juno and the latest ADT plugin. The older folder i.e.
Android-Projects will also continue to work.
</commit_message>
<xml_diff>
--- a/presentation/AndroidDeveloper101Workshop-October6-Nitrodroid-2012-MindStormSoftware.pptx
+++ b/presentation/AndroidDeveloper101Workshop-October6-Nitrodroid-2012-MindStormSoftware.pptx
@@ -1569,6 +1569,1101 @@
       <dsp:cNvGrpSpPr/>
     </dsp:nvGrpSpPr>
     <dsp:grpSpPr/>
+    <dsp:sp modelId="{E1BC9B8F-B260-4A7D-8E0E-9A869D585B0C}">
+      <dsp:nvSpPr>
+        <dsp:cNvPr id="0" name=""/>
+        <dsp:cNvSpPr/>
+      </dsp:nvSpPr>
+      <dsp:spPr>
+        <a:xfrm>
+          <a:off x="2545765" y="1995625"/>
+          <a:ext cx="2243505" cy="258374"/>
+        </a:xfrm>
+        <a:custGeom>
+          <a:avLst/>
+          <a:gdLst/>
+          <a:ahLst/>
+          <a:cxnLst/>
+          <a:rect l="0" t="0" r="0" b="0"/>
+          <a:pathLst>
+            <a:path>
+              <a:moveTo>
+                <a:pt x="0" y="0"/>
+              </a:moveTo>
+              <a:lnTo>
+                <a:pt x="0" y="176074"/>
+              </a:lnTo>
+              <a:lnTo>
+                <a:pt x="2243505" y="176074"/>
+              </a:lnTo>
+              <a:lnTo>
+                <a:pt x="2243505" y="258374"/>
+              </a:lnTo>
+            </a:path>
+          </a:pathLst>
+        </a:custGeom>
+        <a:noFill/>
+        <a:ln w="19050" cap="flat" cmpd="sng" algn="ctr">
+          <a:solidFill>
+            <a:schemeClr val="accent6">
+              <a:hueOff val="0"/>
+              <a:satOff val="0"/>
+              <a:lumOff val="0"/>
+              <a:alphaOff val="0"/>
+            </a:schemeClr>
+          </a:solidFill>
+          <a:prstDash val="solid"/>
+        </a:ln>
+        <a:effectLst/>
+      </dsp:spPr>
+      <dsp:style>
+        <a:lnRef idx="2">
+          <a:scrgbClr r="0" g="0" b="0"/>
+        </a:lnRef>
+        <a:fillRef idx="0">
+          <a:scrgbClr r="0" g="0" b="0"/>
+        </a:fillRef>
+        <a:effectRef idx="0">
+          <a:scrgbClr r="0" g="0" b="0"/>
+        </a:effectRef>
+        <a:fontRef idx="minor"/>
+      </dsp:style>
+    </dsp:sp>
+    <dsp:sp modelId="{01DEB631-A608-427D-B88F-0BB6E3FF29BB}">
+      <dsp:nvSpPr>
+        <dsp:cNvPr id="0" name=""/>
+        <dsp:cNvSpPr/>
+      </dsp:nvSpPr>
+      <dsp:spPr>
+        <a:xfrm>
+          <a:off x="2545765" y="1995625"/>
+          <a:ext cx="1157692" cy="258374"/>
+        </a:xfrm>
+        <a:custGeom>
+          <a:avLst/>
+          <a:gdLst/>
+          <a:ahLst/>
+          <a:cxnLst/>
+          <a:rect l="0" t="0" r="0" b="0"/>
+          <a:pathLst>
+            <a:path>
+              <a:moveTo>
+                <a:pt x="0" y="0"/>
+              </a:moveTo>
+              <a:lnTo>
+                <a:pt x="0" y="176074"/>
+              </a:lnTo>
+              <a:lnTo>
+                <a:pt x="1157692" y="176074"/>
+              </a:lnTo>
+              <a:lnTo>
+                <a:pt x="1157692" y="258374"/>
+              </a:lnTo>
+            </a:path>
+          </a:pathLst>
+        </a:custGeom>
+        <a:noFill/>
+        <a:ln w="19050" cap="flat" cmpd="sng" algn="ctr">
+          <a:solidFill>
+            <a:schemeClr val="accent6">
+              <a:hueOff val="0"/>
+              <a:satOff val="0"/>
+              <a:lumOff val="0"/>
+              <a:alphaOff val="0"/>
+            </a:schemeClr>
+          </a:solidFill>
+          <a:prstDash val="solid"/>
+        </a:ln>
+        <a:effectLst/>
+      </dsp:spPr>
+      <dsp:style>
+        <a:lnRef idx="2">
+          <a:scrgbClr r="0" g="0" b="0"/>
+        </a:lnRef>
+        <a:fillRef idx="0">
+          <a:scrgbClr r="0" g="0" b="0"/>
+        </a:fillRef>
+        <a:effectRef idx="0">
+          <a:scrgbClr r="0" g="0" b="0"/>
+        </a:effectRef>
+        <a:fontRef idx="minor"/>
+      </dsp:style>
+    </dsp:sp>
+    <dsp:sp modelId="{031ACCB7-3D59-4208-A735-8B7645726667}">
+      <dsp:nvSpPr>
+        <dsp:cNvPr id="0" name=""/>
+        <dsp:cNvSpPr/>
+      </dsp:nvSpPr>
+      <dsp:spPr>
+        <a:xfrm>
+          <a:off x="2500045" y="1995625"/>
+          <a:ext cx="91440" cy="258374"/>
+        </a:xfrm>
+        <a:custGeom>
+          <a:avLst/>
+          <a:gdLst/>
+          <a:ahLst/>
+          <a:cxnLst/>
+          <a:rect l="0" t="0" r="0" b="0"/>
+          <a:pathLst>
+            <a:path>
+              <a:moveTo>
+                <a:pt x="45720" y="0"/>
+              </a:moveTo>
+              <a:lnTo>
+                <a:pt x="45720" y="176074"/>
+              </a:lnTo>
+              <a:lnTo>
+                <a:pt x="117599" y="176074"/>
+              </a:lnTo>
+              <a:lnTo>
+                <a:pt x="117599" y="258374"/>
+              </a:lnTo>
+            </a:path>
+          </a:pathLst>
+        </a:custGeom>
+        <a:noFill/>
+        <a:ln w="19050" cap="flat" cmpd="sng" algn="ctr">
+          <a:solidFill>
+            <a:schemeClr val="accent6">
+              <a:hueOff val="0"/>
+              <a:satOff val="0"/>
+              <a:lumOff val="0"/>
+              <a:alphaOff val="0"/>
+            </a:schemeClr>
+          </a:solidFill>
+          <a:prstDash val="solid"/>
+        </a:ln>
+        <a:effectLst/>
+      </dsp:spPr>
+      <dsp:style>
+        <a:lnRef idx="2">
+          <a:scrgbClr r="0" g="0" b="0"/>
+        </a:lnRef>
+        <a:fillRef idx="0">
+          <a:scrgbClr r="0" g="0" b="0"/>
+        </a:fillRef>
+        <a:effectRef idx="0">
+          <a:scrgbClr r="0" g="0" b="0"/>
+        </a:effectRef>
+        <a:fontRef idx="minor"/>
+      </dsp:style>
+    </dsp:sp>
+    <dsp:sp modelId="{7808602A-A678-49DA-8BE3-6E09C0A3C11D}">
+      <dsp:nvSpPr>
+        <dsp:cNvPr id="0" name=""/>
+        <dsp:cNvSpPr/>
+      </dsp:nvSpPr>
+      <dsp:spPr>
+        <a:xfrm>
+          <a:off x="1531832" y="1995625"/>
+          <a:ext cx="1013932" cy="258374"/>
+        </a:xfrm>
+        <a:custGeom>
+          <a:avLst/>
+          <a:gdLst/>
+          <a:ahLst/>
+          <a:cxnLst/>
+          <a:rect l="0" t="0" r="0" b="0"/>
+          <a:pathLst>
+            <a:path>
+              <a:moveTo>
+                <a:pt x="1013932" y="0"/>
+              </a:moveTo>
+              <a:lnTo>
+                <a:pt x="1013932" y="176074"/>
+              </a:lnTo>
+              <a:lnTo>
+                <a:pt x="0" y="176074"/>
+              </a:lnTo>
+              <a:lnTo>
+                <a:pt x="0" y="258374"/>
+              </a:lnTo>
+            </a:path>
+          </a:pathLst>
+        </a:custGeom>
+        <a:noFill/>
+        <a:ln w="19050" cap="flat" cmpd="sng" algn="ctr">
+          <a:solidFill>
+            <a:schemeClr val="accent6">
+              <a:hueOff val="0"/>
+              <a:satOff val="0"/>
+              <a:lumOff val="0"/>
+              <a:alphaOff val="0"/>
+            </a:schemeClr>
+          </a:solidFill>
+          <a:prstDash val="solid"/>
+        </a:ln>
+        <a:effectLst/>
+      </dsp:spPr>
+      <dsp:style>
+        <a:lnRef idx="2">
+          <a:scrgbClr r="0" g="0" b="0"/>
+        </a:lnRef>
+        <a:fillRef idx="0">
+          <a:scrgbClr r="0" g="0" b="0"/>
+        </a:fillRef>
+        <a:effectRef idx="0">
+          <a:scrgbClr r="0" g="0" b="0"/>
+        </a:effectRef>
+        <a:fontRef idx="minor"/>
+      </dsp:style>
+    </dsp:sp>
+    <dsp:sp modelId="{7B854566-974F-406A-9D2D-6DF7A81F293D}">
+      <dsp:nvSpPr>
+        <dsp:cNvPr id="0" name=""/>
+        <dsp:cNvSpPr/>
+      </dsp:nvSpPr>
+      <dsp:spPr>
+        <a:xfrm>
+          <a:off x="446019" y="1995625"/>
+          <a:ext cx="2099745" cy="258374"/>
+        </a:xfrm>
+        <a:custGeom>
+          <a:avLst/>
+          <a:gdLst/>
+          <a:ahLst/>
+          <a:cxnLst/>
+          <a:rect l="0" t="0" r="0" b="0"/>
+          <a:pathLst>
+            <a:path>
+              <a:moveTo>
+                <a:pt x="2099745" y="0"/>
+              </a:moveTo>
+              <a:lnTo>
+                <a:pt x="2099745" y="176074"/>
+              </a:lnTo>
+              <a:lnTo>
+                <a:pt x="0" y="176074"/>
+              </a:lnTo>
+              <a:lnTo>
+                <a:pt x="0" y="258374"/>
+              </a:lnTo>
+            </a:path>
+          </a:pathLst>
+        </a:custGeom>
+        <a:noFill/>
+        <a:ln w="19050" cap="flat" cmpd="sng" algn="ctr">
+          <a:solidFill>
+            <a:schemeClr val="accent6">
+              <a:hueOff val="0"/>
+              <a:satOff val="0"/>
+              <a:lumOff val="0"/>
+              <a:alphaOff val="0"/>
+            </a:schemeClr>
+          </a:solidFill>
+          <a:prstDash val="solid"/>
+        </a:ln>
+        <a:effectLst/>
+      </dsp:spPr>
+      <dsp:style>
+        <a:lnRef idx="2">
+          <a:scrgbClr r="0" g="0" b="0"/>
+        </a:lnRef>
+        <a:fillRef idx="0">
+          <a:scrgbClr r="0" g="0" b="0"/>
+        </a:fillRef>
+        <a:effectRef idx="0">
+          <a:scrgbClr r="0" g="0" b="0"/>
+        </a:effectRef>
+        <a:fontRef idx="minor"/>
+      </dsp:style>
+    </dsp:sp>
+    <dsp:sp modelId="{AF9D0EE9-C42A-4D44-9548-2504EB473202}">
+      <dsp:nvSpPr>
+        <dsp:cNvPr id="0" name=""/>
+        <dsp:cNvSpPr/>
+      </dsp:nvSpPr>
+      <dsp:spPr>
+        <a:xfrm>
+          <a:off x="2101568" y="1431496"/>
+          <a:ext cx="888392" cy="564129"/>
+        </a:xfrm>
+        <a:prstGeom prst="roundRect">
+          <a:avLst>
+            <a:gd name="adj" fmla="val 10000"/>
+          </a:avLst>
+        </a:prstGeom>
+        <a:solidFill>
+          <a:schemeClr val="accent4">
+            <a:hueOff val="0"/>
+            <a:satOff val="0"/>
+            <a:lumOff val="0"/>
+            <a:alphaOff val="0"/>
+          </a:schemeClr>
+        </a:solidFill>
+        <a:ln w="19050" cap="flat" cmpd="sng" algn="ctr">
+          <a:solidFill>
+            <a:schemeClr val="lt1">
+              <a:hueOff val="0"/>
+              <a:satOff val="0"/>
+              <a:lumOff val="0"/>
+              <a:alphaOff val="0"/>
+            </a:schemeClr>
+          </a:solidFill>
+          <a:prstDash val="solid"/>
+        </a:ln>
+        <a:effectLst/>
+      </dsp:spPr>
+      <dsp:style>
+        <a:lnRef idx="2">
+          <a:scrgbClr r="0" g="0" b="0"/>
+        </a:lnRef>
+        <a:fillRef idx="1">
+          <a:scrgbClr r="0" g="0" b="0"/>
+        </a:fillRef>
+        <a:effectRef idx="0">
+          <a:scrgbClr r="0" g="0" b="0"/>
+        </a:effectRef>
+        <a:fontRef idx="minor">
+          <a:schemeClr val="lt1"/>
+        </a:fontRef>
+      </dsp:style>
+    </dsp:sp>
+    <dsp:sp modelId="{25A768D3-3859-46D5-9D83-FD4225F52382}">
+      <dsp:nvSpPr>
+        <dsp:cNvPr id="0" name=""/>
+        <dsp:cNvSpPr/>
+      </dsp:nvSpPr>
+      <dsp:spPr>
+        <a:xfrm>
+          <a:off x="2200279" y="1525271"/>
+          <a:ext cx="888392" cy="564129"/>
+        </a:xfrm>
+        <a:prstGeom prst="roundRect">
+          <a:avLst>
+            <a:gd name="adj" fmla="val 10000"/>
+          </a:avLst>
+        </a:prstGeom>
+        <a:solidFill>
+          <a:schemeClr val="lt1">
+            <a:alpha val="90000"/>
+            <a:hueOff val="0"/>
+            <a:satOff val="0"/>
+            <a:lumOff val="0"/>
+            <a:alphaOff val="0"/>
+          </a:schemeClr>
+        </a:solidFill>
+        <a:ln w="19050" cap="flat" cmpd="sng" algn="ctr">
+          <a:solidFill>
+            <a:schemeClr val="accent4">
+              <a:hueOff val="0"/>
+              <a:satOff val="0"/>
+              <a:lumOff val="0"/>
+              <a:alphaOff val="0"/>
+            </a:schemeClr>
+          </a:solidFill>
+          <a:prstDash val="solid"/>
+        </a:ln>
+        <a:effectLst/>
+      </dsp:spPr>
+      <dsp:style>
+        <a:lnRef idx="2">
+          <a:scrgbClr r="0" g="0" b="0"/>
+        </a:lnRef>
+        <a:fillRef idx="1">
+          <a:scrgbClr r="0" g="0" b="0"/>
+        </a:fillRef>
+        <a:effectRef idx="0">
+          <a:scrgbClr r="0" g="0" b="0"/>
+        </a:effectRef>
+        <a:fontRef idx="minor"/>
+      </dsp:style>
+      <dsp:txBody>
+        <a:bodyPr spcFirstLastPara="0" vert="horz" wrap="square" lIns="60960" tIns="60960" rIns="60960" bIns="60960" numCol="1" spcCol="1270" anchor="ctr" anchorCtr="0">
+          <a:noAutofit/>
+        </a:bodyPr>
+        <a:lstStyle/>
+        <a:p>
+          <a:pPr lvl="0" algn="ctr" defTabSz="711200">
+            <a:lnSpc>
+              <a:spcPct val="90000"/>
+            </a:lnSpc>
+            <a:spcBef>
+              <a:spcPct val="0"/>
+            </a:spcBef>
+            <a:spcAft>
+              <a:spcPct val="35000"/>
+            </a:spcAft>
+          </a:pPr>
+          <a:r>
+            <a:rPr lang="en-US" sz="1600" kern="1200" dirty="0" smtClean="0"/>
+            <a:t>Linear Layout</a:t>
+          </a:r>
+          <a:endParaRPr lang="en-IN" sz="1600" kern="1200" dirty="0"/>
+        </a:p>
+      </dsp:txBody>
+      <dsp:txXfrm>
+        <a:off x="2200279" y="1525271"/>
+        <a:ext cx="888392" cy="564129"/>
+      </dsp:txXfrm>
+    </dsp:sp>
+    <dsp:sp modelId="{EC100101-92DD-4D20-9701-FAD85A795761}">
+      <dsp:nvSpPr>
+        <dsp:cNvPr id="0" name=""/>
+        <dsp:cNvSpPr/>
+      </dsp:nvSpPr>
+      <dsp:spPr>
+        <a:xfrm>
+          <a:off x="1823" y="2253999"/>
+          <a:ext cx="888392" cy="564129"/>
+        </a:xfrm>
+        <a:prstGeom prst="roundRect">
+          <a:avLst>
+            <a:gd name="adj" fmla="val 10000"/>
+          </a:avLst>
+        </a:prstGeom>
+        <a:solidFill>
+          <a:schemeClr val="accent6">
+            <a:hueOff val="0"/>
+            <a:satOff val="0"/>
+            <a:lumOff val="0"/>
+            <a:alphaOff val="0"/>
+          </a:schemeClr>
+        </a:solidFill>
+        <a:ln w="19050" cap="flat" cmpd="sng" algn="ctr">
+          <a:solidFill>
+            <a:schemeClr val="lt1">
+              <a:hueOff val="0"/>
+              <a:satOff val="0"/>
+              <a:lumOff val="0"/>
+              <a:alphaOff val="0"/>
+            </a:schemeClr>
+          </a:solidFill>
+          <a:prstDash val="solid"/>
+        </a:ln>
+        <a:effectLst/>
+      </dsp:spPr>
+      <dsp:style>
+        <a:lnRef idx="2">
+          <a:scrgbClr r="0" g="0" b="0"/>
+        </a:lnRef>
+        <a:fillRef idx="1">
+          <a:scrgbClr r="0" g="0" b="0"/>
+        </a:fillRef>
+        <a:effectRef idx="0">
+          <a:scrgbClr r="0" g="0" b="0"/>
+        </a:effectRef>
+        <a:fontRef idx="minor">
+          <a:schemeClr val="lt1"/>
+        </a:fontRef>
+      </dsp:style>
+    </dsp:sp>
+    <dsp:sp modelId="{1113A76B-E984-440D-AECE-6D8662A7EB0B}">
+      <dsp:nvSpPr>
+        <dsp:cNvPr id="0" name=""/>
+        <dsp:cNvSpPr/>
+      </dsp:nvSpPr>
+      <dsp:spPr>
+        <a:xfrm>
+          <a:off x="100533" y="2347774"/>
+          <a:ext cx="888392" cy="564129"/>
+        </a:xfrm>
+        <a:prstGeom prst="roundRect">
+          <a:avLst>
+            <a:gd name="adj" fmla="val 10000"/>
+          </a:avLst>
+        </a:prstGeom>
+        <a:solidFill>
+          <a:schemeClr val="lt1">
+            <a:alpha val="90000"/>
+            <a:hueOff val="0"/>
+            <a:satOff val="0"/>
+            <a:lumOff val="0"/>
+            <a:alphaOff val="0"/>
+          </a:schemeClr>
+        </a:solidFill>
+        <a:ln w="19050" cap="flat" cmpd="sng" algn="ctr">
+          <a:solidFill>
+            <a:schemeClr val="accent6">
+              <a:hueOff val="0"/>
+              <a:satOff val="0"/>
+              <a:lumOff val="0"/>
+              <a:alphaOff val="0"/>
+            </a:schemeClr>
+          </a:solidFill>
+          <a:prstDash val="solid"/>
+        </a:ln>
+        <a:effectLst/>
+      </dsp:spPr>
+      <dsp:style>
+        <a:lnRef idx="2">
+          <a:scrgbClr r="0" g="0" b="0"/>
+        </a:lnRef>
+        <a:fillRef idx="1">
+          <a:scrgbClr r="0" g="0" b="0"/>
+        </a:fillRef>
+        <a:effectRef idx="0">
+          <a:scrgbClr r="0" g="0" b="0"/>
+        </a:effectRef>
+        <a:fontRef idx="minor"/>
+      </dsp:style>
+      <dsp:txBody>
+        <a:bodyPr spcFirstLastPara="0" vert="horz" wrap="square" lIns="60960" tIns="60960" rIns="60960" bIns="60960" numCol="1" spcCol="1270" anchor="ctr" anchorCtr="0">
+          <a:noAutofit/>
+        </a:bodyPr>
+        <a:lstStyle/>
+        <a:p>
+          <a:pPr lvl="0" algn="ctr" defTabSz="711200">
+            <a:lnSpc>
+              <a:spcPct val="90000"/>
+            </a:lnSpc>
+            <a:spcBef>
+              <a:spcPct val="0"/>
+            </a:spcBef>
+            <a:spcAft>
+              <a:spcPct val="35000"/>
+            </a:spcAft>
+          </a:pPr>
+          <a:r>
+            <a:rPr lang="en-US" sz="1600" kern="1200" dirty="0" smtClean="0"/>
+            <a:t>Button</a:t>
+          </a:r>
+          <a:endParaRPr lang="en-IN" sz="1600" kern="1200" dirty="0"/>
+        </a:p>
+      </dsp:txBody>
+      <dsp:txXfrm>
+        <a:off x="100533" y="2347774"/>
+        <a:ext cx="888392" cy="564129"/>
+      </dsp:txXfrm>
+    </dsp:sp>
+    <dsp:sp modelId="{5D4784FD-058A-4276-AB6D-2E0FA6286CAF}">
+      <dsp:nvSpPr>
+        <dsp:cNvPr id="0" name=""/>
+        <dsp:cNvSpPr/>
+      </dsp:nvSpPr>
+      <dsp:spPr>
+        <a:xfrm>
+          <a:off x="1087635" y="2253999"/>
+          <a:ext cx="888392" cy="564129"/>
+        </a:xfrm>
+        <a:prstGeom prst="roundRect">
+          <a:avLst>
+            <a:gd name="adj" fmla="val 10000"/>
+          </a:avLst>
+        </a:prstGeom>
+        <a:solidFill>
+          <a:schemeClr val="accent6">
+            <a:hueOff val="0"/>
+            <a:satOff val="0"/>
+            <a:lumOff val="0"/>
+            <a:alphaOff val="0"/>
+          </a:schemeClr>
+        </a:solidFill>
+        <a:ln w="19050" cap="flat" cmpd="sng" algn="ctr">
+          <a:solidFill>
+            <a:schemeClr val="lt1">
+              <a:hueOff val="0"/>
+              <a:satOff val="0"/>
+              <a:lumOff val="0"/>
+              <a:alphaOff val="0"/>
+            </a:schemeClr>
+          </a:solidFill>
+          <a:prstDash val="solid"/>
+        </a:ln>
+        <a:effectLst/>
+      </dsp:spPr>
+      <dsp:style>
+        <a:lnRef idx="2">
+          <a:scrgbClr r="0" g="0" b="0"/>
+        </a:lnRef>
+        <a:fillRef idx="1">
+          <a:scrgbClr r="0" g="0" b="0"/>
+        </a:fillRef>
+        <a:effectRef idx="0">
+          <a:scrgbClr r="0" g="0" b="0"/>
+        </a:effectRef>
+        <a:fontRef idx="minor">
+          <a:schemeClr val="lt1"/>
+        </a:fontRef>
+      </dsp:style>
+    </dsp:sp>
+    <dsp:sp modelId="{3EC870B7-8A23-4E4E-BFFF-9C77A7058F47}">
+      <dsp:nvSpPr>
+        <dsp:cNvPr id="0" name=""/>
+        <dsp:cNvSpPr/>
+      </dsp:nvSpPr>
+      <dsp:spPr>
+        <a:xfrm>
+          <a:off x="1186346" y="2347774"/>
+          <a:ext cx="888392" cy="564129"/>
+        </a:xfrm>
+        <a:prstGeom prst="roundRect">
+          <a:avLst>
+            <a:gd name="adj" fmla="val 10000"/>
+          </a:avLst>
+        </a:prstGeom>
+        <a:solidFill>
+          <a:schemeClr val="lt1">
+            <a:alpha val="90000"/>
+            <a:hueOff val="0"/>
+            <a:satOff val="0"/>
+            <a:lumOff val="0"/>
+            <a:alphaOff val="0"/>
+          </a:schemeClr>
+        </a:solidFill>
+        <a:ln w="19050" cap="flat" cmpd="sng" algn="ctr">
+          <a:solidFill>
+            <a:schemeClr val="accent6">
+              <a:hueOff val="0"/>
+              <a:satOff val="0"/>
+              <a:lumOff val="0"/>
+              <a:alphaOff val="0"/>
+            </a:schemeClr>
+          </a:solidFill>
+          <a:prstDash val="solid"/>
+        </a:ln>
+        <a:effectLst/>
+      </dsp:spPr>
+      <dsp:style>
+        <a:lnRef idx="2">
+          <a:scrgbClr r="0" g="0" b="0"/>
+        </a:lnRef>
+        <a:fillRef idx="1">
+          <a:scrgbClr r="0" g="0" b="0"/>
+        </a:fillRef>
+        <a:effectRef idx="0">
+          <a:scrgbClr r="0" g="0" b="0"/>
+        </a:effectRef>
+        <a:fontRef idx="minor"/>
+      </dsp:style>
+      <dsp:txBody>
+        <a:bodyPr spcFirstLastPara="0" vert="horz" wrap="square" lIns="60960" tIns="60960" rIns="60960" bIns="60960" numCol="1" spcCol="1270" anchor="ctr" anchorCtr="0">
+          <a:noAutofit/>
+        </a:bodyPr>
+        <a:lstStyle/>
+        <a:p>
+          <a:pPr lvl="0" algn="ctr" defTabSz="711200">
+            <a:lnSpc>
+              <a:spcPct val="90000"/>
+            </a:lnSpc>
+            <a:spcBef>
+              <a:spcPct val="0"/>
+            </a:spcBef>
+            <a:spcAft>
+              <a:spcPct val="35000"/>
+            </a:spcAft>
+          </a:pPr>
+          <a:r>
+            <a:rPr lang="en-US" sz="1600" kern="1200" dirty="0" smtClean="0"/>
+            <a:t>Text</a:t>
+          </a:r>
+          <a:br>
+            <a:rPr lang="en-US" sz="1600" kern="1200" dirty="0" smtClean="0"/>
+          </a:br>
+          <a:r>
+            <a:rPr lang="en-US" sz="1600" kern="1200" dirty="0" smtClean="0"/>
+            <a:t>View</a:t>
+          </a:r>
+          <a:endParaRPr lang="en-IN" sz="1600" kern="1200" dirty="0"/>
+        </a:p>
+      </dsp:txBody>
+      <dsp:txXfrm>
+        <a:off x="1186346" y="2347774"/>
+        <a:ext cx="888392" cy="564129"/>
+      </dsp:txXfrm>
+    </dsp:sp>
+    <dsp:sp modelId="{1EDC7A99-6B34-40C4-8DA1-F493D64100B7}">
+      <dsp:nvSpPr>
+        <dsp:cNvPr id="0" name=""/>
+        <dsp:cNvSpPr/>
+      </dsp:nvSpPr>
+      <dsp:spPr>
+        <a:xfrm>
+          <a:off x="2173448" y="2253999"/>
+          <a:ext cx="888392" cy="564129"/>
+        </a:xfrm>
+        <a:prstGeom prst="roundRect">
+          <a:avLst>
+            <a:gd name="adj" fmla="val 10000"/>
+          </a:avLst>
+        </a:prstGeom>
+        <a:solidFill>
+          <a:schemeClr val="accent6">
+            <a:hueOff val="0"/>
+            <a:satOff val="0"/>
+            <a:lumOff val="0"/>
+            <a:alphaOff val="0"/>
+          </a:schemeClr>
+        </a:solidFill>
+        <a:ln w="19050" cap="flat" cmpd="sng" algn="ctr">
+          <a:solidFill>
+            <a:schemeClr val="lt1">
+              <a:hueOff val="0"/>
+              <a:satOff val="0"/>
+              <a:lumOff val="0"/>
+              <a:alphaOff val="0"/>
+            </a:schemeClr>
+          </a:solidFill>
+          <a:prstDash val="solid"/>
+        </a:ln>
+        <a:effectLst/>
+      </dsp:spPr>
+      <dsp:style>
+        <a:lnRef idx="2">
+          <a:scrgbClr r="0" g="0" b="0"/>
+        </a:lnRef>
+        <a:fillRef idx="1">
+          <a:scrgbClr r="0" g="0" b="0"/>
+        </a:fillRef>
+        <a:effectRef idx="0">
+          <a:scrgbClr r="0" g="0" b="0"/>
+        </a:effectRef>
+        <a:fontRef idx="minor">
+          <a:schemeClr val="lt1"/>
+        </a:fontRef>
+      </dsp:style>
+    </dsp:sp>
+    <dsp:sp modelId="{1796688C-6770-4E3C-9BA8-A61375DC5047}">
+      <dsp:nvSpPr>
+        <dsp:cNvPr id="0" name=""/>
+        <dsp:cNvSpPr/>
+      </dsp:nvSpPr>
+      <dsp:spPr>
+        <a:xfrm>
+          <a:off x="2272158" y="2347774"/>
+          <a:ext cx="888392" cy="564129"/>
+        </a:xfrm>
+        <a:prstGeom prst="roundRect">
+          <a:avLst>
+            <a:gd name="adj" fmla="val 10000"/>
+          </a:avLst>
+        </a:prstGeom>
+        <a:solidFill>
+          <a:schemeClr val="lt1">
+            <a:alpha val="90000"/>
+            <a:hueOff val="0"/>
+            <a:satOff val="0"/>
+            <a:lumOff val="0"/>
+            <a:alphaOff val="0"/>
+          </a:schemeClr>
+        </a:solidFill>
+        <a:ln w="19050" cap="flat" cmpd="sng" algn="ctr">
+          <a:solidFill>
+            <a:schemeClr val="accent6">
+              <a:hueOff val="0"/>
+              <a:satOff val="0"/>
+              <a:lumOff val="0"/>
+              <a:alphaOff val="0"/>
+            </a:schemeClr>
+          </a:solidFill>
+          <a:prstDash val="solid"/>
+        </a:ln>
+        <a:effectLst/>
+      </dsp:spPr>
+      <dsp:style>
+        <a:lnRef idx="2">
+          <a:scrgbClr r="0" g="0" b="0"/>
+        </a:lnRef>
+        <a:fillRef idx="1">
+          <a:scrgbClr r="0" g="0" b="0"/>
+        </a:fillRef>
+        <a:effectRef idx="0">
+          <a:scrgbClr r="0" g="0" b="0"/>
+        </a:effectRef>
+        <a:fontRef idx="minor"/>
+      </dsp:style>
+      <dsp:txBody>
+        <a:bodyPr spcFirstLastPara="0" vert="horz" wrap="square" lIns="60960" tIns="60960" rIns="60960" bIns="60960" numCol="1" spcCol="1270" anchor="ctr" anchorCtr="0">
+          <a:noAutofit/>
+        </a:bodyPr>
+        <a:lstStyle/>
+        <a:p>
+          <a:pPr lvl="0" algn="ctr" defTabSz="711200">
+            <a:lnSpc>
+              <a:spcPct val="90000"/>
+            </a:lnSpc>
+            <a:spcBef>
+              <a:spcPct val="0"/>
+            </a:spcBef>
+            <a:spcAft>
+              <a:spcPct val="35000"/>
+            </a:spcAft>
+          </a:pPr>
+          <a:r>
+            <a:rPr lang="en-US" sz="1600" kern="1200" dirty="0" smtClean="0"/>
+            <a:t>Edit </a:t>
+          </a:r>
+          <a:br>
+            <a:rPr lang="en-US" sz="1600" kern="1200" dirty="0" smtClean="0"/>
+          </a:br>
+          <a:r>
+            <a:rPr lang="en-US" sz="1600" kern="1200" dirty="0" smtClean="0"/>
+            <a:t>Text</a:t>
+          </a:r>
+          <a:endParaRPr lang="en-IN" sz="1600" kern="1200" dirty="0"/>
+        </a:p>
+      </dsp:txBody>
+      <dsp:txXfrm>
+        <a:off x="2272158" y="2347774"/>
+        <a:ext cx="888392" cy="564129"/>
+      </dsp:txXfrm>
+    </dsp:sp>
+    <dsp:sp modelId="{2A18DF43-7699-4F70-9D78-EDE0D34DEEDA}">
+      <dsp:nvSpPr>
+        <dsp:cNvPr id="0" name=""/>
+        <dsp:cNvSpPr/>
+      </dsp:nvSpPr>
+      <dsp:spPr>
+        <a:xfrm>
+          <a:off x="3259261" y="2253999"/>
+          <a:ext cx="888392" cy="564129"/>
+        </a:xfrm>
+        <a:prstGeom prst="roundRect">
+          <a:avLst>
+            <a:gd name="adj" fmla="val 10000"/>
+          </a:avLst>
+        </a:prstGeom>
+        <a:solidFill>
+          <a:schemeClr val="accent6">
+            <a:hueOff val="0"/>
+            <a:satOff val="0"/>
+            <a:lumOff val="0"/>
+            <a:alphaOff val="0"/>
+          </a:schemeClr>
+        </a:solidFill>
+        <a:ln w="19050" cap="flat" cmpd="sng" algn="ctr">
+          <a:solidFill>
+            <a:schemeClr val="lt1">
+              <a:hueOff val="0"/>
+              <a:satOff val="0"/>
+              <a:lumOff val="0"/>
+              <a:alphaOff val="0"/>
+            </a:schemeClr>
+          </a:solidFill>
+          <a:prstDash val="solid"/>
+        </a:ln>
+        <a:effectLst/>
+      </dsp:spPr>
+      <dsp:style>
+        <a:lnRef idx="2">
+          <a:scrgbClr r="0" g="0" b="0"/>
+        </a:lnRef>
+        <a:fillRef idx="1">
+          <a:scrgbClr r="0" g="0" b="0"/>
+        </a:fillRef>
+        <a:effectRef idx="0">
+          <a:scrgbClr r="0" g="0" b="0"/>
+        </a:effectRef>
+        <a:fontRef idx="minor">
+          <a:schemeClr val="lt1"/>
+        </a:fontRef>
+      </dsp:style>
+    </dsp:sp>
+    <dsp:sp modelId="{A912B26A-1D92-4FB1-921E-F2D7A07C27DA}">
+      <dsp:nvSpPr>
+        <dsp:cNvPr id="0" name=""/>
+        <dsp:cNvSpPr/>
+      </dsp:nvSpPr>
+      <dsp:spPr>
+        <a:xfrm>
+          <a:off x="3357971" y="2347774"/>
+          <a:ext cx="888392" cy="564129"/>
+        </a:xfrm>
+        <a:prstGeom prst="roundRect">
+          <a:avLst>
+            <a:gd name="adj" fmla="val 10000"/>
+          </a:avLst>
+        </a:prstGeom>
+        <a:solidFill>
+          <a:schemeClr val="lt1">
+            <a:alpha val="90000"/>
+            <a:hueOff val="0"/>
+            <a:satOff val="0"/>
+            <a:lumOff val="0"/>
+            <a:alphaOff val="0"/>
+          </a:schemeClr>
+        </a:solidFill>
+        <a:ln w="19050" cap="flat" cmpd="sng" algn="ctr">
+          <a:solidFill>
+            <a:schemeClr val="accent6">
+              <a:hueOff val="0"/>
+              <a:satOff val="0"/>
+              <a:lumOff val="0"/>
+              <a:alphaOff val="0"/>
+            </a:schemeClr>
+          </a:solidFill>
+          <a:prstDash val="solid"/>
+        </a:ln>
+        <a:effectLst/>
+      </dsp:spPr>
+      <dsp:style>
+        <a:lnRef idx="2">
+          <a:scrgbClr r="0" g="0" b="0"/>
+        </a:lnRef>
+        <a:fillRef idx="1">
+          <a:scrgbClr r="0" g="0" b="0"/>
+        </a:fillRef>
+        <a:effectRef idx="0">
+          <a:scrgbClr r="0" g="0" b="0"/>
+        </a:effectRef>
+        <a:fontRef idx="minor"/>
+      </dsp:style>
+      <dsp:txBody>
+        <a:bodyPr spcFirstLastPara="0" vert="horz" wrap="square" lIns="60960" tIns="60960" rIns="60960" bIns="60960" numCol="1" spcCol="1270" anchor="ctr" anchorCtr="0">
+          <a:noAutofit/>
+        </a:bodyPr>
+        <a:lstStyle/>
+        <a:p>
+          <a:pPr lvl="0" algn="ctr" defTabSz="711200">
+            <a:lnSpc>
+              <a:spcPct val="90000"/>
+            </a:lnSpc>
+            <a:spcBef>
+              <a:spcPct val="0"/>
+            </a:spcBef>
+            <a:spcAft>
+              <a:spcPct val="35000"/>
+            </a:spcAft>
+          </a:pPr>
+          <a:r>
+            <a:rPr lang="en-US" sz="1600" kern="1200" dirty="0" smtClean="0"/>
+            <a:t>Text View</a:t>
+          </a:r>
+          <a:endParaRPr lang="en-IN" sz="1600" kern="1200" dirty="0"/>
+        </a:p>
+      </dsp:txBody>
+      <dsp:txXfrm>
+        <a:off x="3357971" y="2347774"/>
+        <a:ext cx="888392" cy="564129"/>
+      </dsp:txXfrm>
+    </dsp:sp>
+    <dsp:sp modelId="{267F4A6D-6151-4A85-BFA2-039DE2284D63}">
+      <dsp:nvSpPr>
+        <dsp:cNvPr id="0" name=""/>
+        <dsp:cNvSpPr/>
+      </dsp:nvSpPr>
+      <dsp:spPr>
+        <a:xfrm>
+          <a:off x="4345074" y="2253999"/>
+          <a:ext cx="888392" cy="564129"/>
+        </a:xfrm>
+        <a:prstGeom prst="roundRect">
+          <a:avLst>
+            <a:gd name="adj" fmla="val 10000"/>
+          </a:avLst>
+        </a:prstGeom>
+        <a:solidFill>
+          <a:schemeClr val="accent6">
+            <a:hueOff val="0"/>
+            <a:satOff val="0"/>
+            <a:lumOff val="0"/>
+            <a:alphaOff val="0"/>
+          </a:schemeClr>
+        </a:solidFill>
+        <a:ln w="19050" cap="flat" cmpd="sng" algn="ctr">
+          <a:solidFill>
+            <a:schemeClr val="lt1">
+              <a:hueOff val="0"/>
+              <a:satOff val="0"/>
+              <a:lumOff val="0"/>
+              <a:alphaOff val="0"/>
+            </a:schemeClr>
+          </a:solidFill>
+          <a:prstDash val="solid"/>
+        </a:ln>
+        <a:effectLst/>
+      </dsp:spPr>
+      <dsp:style>
+        <a:lnRef idx="2">
+          <a:scrgbClr r="0" g="0" b="0"/>
+        </a:lnRef>
+        <a:fillRef idx="1">
+          <a:scrgbClr r="0" g="0" b="0"/>
+        </a:fillRef>
+        <a:effectRef idx="0">
+          <a:scrgbClr r="0" g="0" b="0"/>
+        </a:effectRef>
+        <a:fontRef idx="minor">
+          <a:schemeClr val="lt1"/>
+        </a:fontRef>
+      </dsp:style>
+    </dsp:sp>
+    <dsp:sp modelId="{A48905BF-C547-4D73-B43C-30279FB7FC7A}">
+      <dsp:nvSpPr>
+        <dsp:cNvPr id="0" name=""/>
+        <dsp:cNvSpPr/>
+      </dsp:nvSpPr>
+      <dsp:spPr>
+        <a:xfrm>
+          <a:off x="4443784" y="2347774"/>
+          <a:ext cx="888392" cy="564129"/>
+        </a:xfrm>
+        <a:prstGeom prst="roundRect">
+          <a:avLst>
+            <a:gd name="adj" fmla="val 10000"/>
+          </a:avLst>
+        </a:prstGeom>
+        <a:solidFill>
+          <a:schemeClr val="lt1">
+            <a:alpha val="90000"/>
+            <a:hueOff val="0"/>
+            <a:satOff val="0"/>
+            <a:lumOff val="0"/>
+            <a:alphaOff val="0"/>
+          </a:schemeClr>
+        </a:solidFill>
+        <a:ln w="19050" cap="flat" cmpd="sng" algn="ctr">
+          <a:solidFill>
+            <a:schemeClr val="accent6">
+              <a:hueOff val="0"/>
+              <a:satOff val="0"/>
+              <a:lumOff val="0"/>
+              <a:alphaOff val="0"/>
+            </a:schemeClr>
+          </a:solidFill>
+          <a:prstDash val="solid"/>
+        </a:ln>
+        <a:effectLst/>
+      </dsp:spPr>
+      <dsp:style>
+        <a:lnRef idx="2">
+          <a:scrgbClr r="0" g="0" b="0"/>
+        </a:lnRef>
+        <a:fillRef idx="1">
+          <a:scrgbClr r="0" g="0" b="0"/>
+        </a:fillRef>
+        <a:effectRef idx="0">
+          <a:scrgbClr r="0" g="0" b="0"/>
+        </a:effectRef>
+        <a:fontRef idx="minor"/>
+      </dsp:style>
+      <dsp:txBody>
+        <a:bodyPr spcFirstLastPara="0" vert="horz" wrap="square" lIns="60960" tIns="60960" rIns="60960" bIns="60960" numCol="1" spcCol="1270" anchor="ctr" anchorCtr="0">
+          <a:noAutofit/>
+        </a:bodyPr>
+        <a:lstStyle/>
+        <a:p>
+          <a:pPr lvl="0" algn="ctr" defTabSz="711200">
+            <a:lnSpc>
+              <a:spcPct val="90000"/>
+            </a:lnSpc>
+            <a:spcBef>
+              <a:spcPct val="0"/>
+            </a:spcBef>
+            <a:spcAft>
+              <a:spcPct val="35000"/>
+            </a:spcAft>
+          </a:pPr>
+          <a:r>
+            <a:rPr lang="en-US" sz="1600" kern="1200" dirty="0" smtClean="0"/>
+            <a:t>Edit </a:t>
+          </a:r>
+          <a:br>
+            <a:rPr lang="en-US" sz="1600" kern="1200" dirty="0" smtClean="0"/>
+          </a:br>
+          <a:r>
+            <a:rPr lang="en-US" sz="1600" kern="1200" dirty="0" smtClean="0"/>
+            <a:t>Text</a:t>
+          </a:r>
+          <a:endParaRPr lang="en-IN" sz="1600" kern="1200" dirty="0"/>
+        </a:p>
+      </dsp:txBody>
+      <dsp:txXfrm>
+        <a:off x="4443784" y="2347774"/>
+        <a:ext cx="888392" cy="564129"/>
+      </dsp:txXfrm>
+    </dsp:sp>
   </dsp:spTree>
 </dsp:drawing>
 </file>
@@ -3253,7 +4348,7 @@
             <a:fld id="{8B5B4661-7944-47B9-8CA6-261FDBE6DC57}" type="datetimeFigureOut">
               <a:rPr lang="en-US" smtClean="0"/>
               <a:pPr/>
-              <a:t>04-Oct-12</a:t>
+              <a:t>05-Oct-12</a:t>
             </a:fld>
             <a:endParaRPr lang="en-US"/>
           </a:p>
@@ -10650,8 +11745,8 @@
         </p:blipFill>
         <p:spPr bwMode="auto">
           <a:xfrm>
-            <a:off x="2133600" y="2133600"/>
-            <a:ext cx="4648200" cy="3886200"/>
+            <a:off x="914400" y="2438400"/>
+            <a:ext cx="3048000" cy="3048000"/>
           </a:xfrm>
           <a:prstGeom prst="rect">
             <a:avLst/>
@@ -27757,16 +28852,127 @@
           <a:chExt cx="0" cy="0"/>
         </a:xfrm>
       </p:grpSpPr>
+      <p:sp>
+        <p:nvSpPr>
+          <p:cNvPr id="2" name="Title 1"/>
+          <p:cNvSpPr>
+            <a:spLocks noGrp="1"/>
+          </p:cNvSpPr>
+          <p:nvPr>
+            <p:ph type="title"/>
+          </p:nvPr>
+        </p:nvSpPr>
+        <p:spPr/>
+        <p:txBody>
+          <a:bodyPr/>
+          <a:lstStyle/>
+          <a:p>
+            <a:pPr algn="ctr"/>
+            <a:r>
+              <a:rPr lang="en-US" dirty="0" smtClean="0"/>
+              <a:t>Android Marketplace</a:t>
+            </a:r>
+            <a:endParaRPr lang="en-IN" dirty="0"/>
+          </a:p>
+        </p:txBody>
+      </p:sp>
+      <p:sp>
+        <p:nvSpPr>
+          <p:cNvPr id="3" name="Date Placeholder 2"/>
+          <p:cNvSpPr>
+            <a:spLocks noGrp="1"/>
+          </p:cNvSpPr>
+          <p:nvPr>
+            <p:ph type="dt" sz="half" idx="10"/>
+          </p:nvPr>
+        </p:nvSpPr>
+        <p:spPr/>
+        <p:txBody>
+          <a:bodyPr/>
+          <a:lstStyle/>
+          <a:p>
+            <a:r>
+              <a:rPr lang="en-US" smtClean="0"/>
+              <a:t>2011-2012</a:t>
+            </a:r>
+            <a:endParaRPr lang="en-US" dirty="0"/>
+          </a:p>
+        </p:txBody>
+      </p:sp>
+      <p:sp>
+        <p:nvSpPr>
+          <p:cNvPr id="4" name="Content Placeholder 3"/>
+          <p:cNvSpPr>
+            <a:spLocks noGrp="1"/>
+          </p:cNvSpPr>
+          <p:nvPr>
+            <p:ph sz="quarter" idx="1"/>
+          </p:nvPr>
+        </p:nvSpPr>
+        <p:spPr>
+          <a:xfrm>
+            <a:off x="612648" y="1600200"/>
+            <a:ext cx="8153400" cy="1066800"/>
+          </a:xfrm>
+        </p:spPr>
+        <p:txBody>
+          <a:bodyPr/>
+          <a:lstStyle/>
+          <a:p>
+            <a:r>
+              <a:rPr lang="en-US" dirty="0" smtClean="0"/>
+              <a:t>For the Publisher – Login and visit </a:t>
+            </a:r>
+            <a:r>
+              <a:rPr lang="en-US" dirty="0" smtClean="0">
+                <a:hlinkClick r:id="rId2"/>
+              </a:rPr>
+              <a:t>https://play.google.com/apps/publish/Home</a:t>
+            </a:r>
+            <a:r>
+              <a:rPr lang="en-US" dirty="0" smtClean="0"/>
+              <a:t> </a:t>
+            </a:r>
+            <a:endParaRPr lang="en-IN" dirty="0"/>
+          </a:p>
+        </p:txBody>
+      </p:sp>
+      <p:sp>
+        <p:nvSpPr>
+          <p:cNvPr id="5" name="Slide Number Placeholder 4"/>
+          <p:cNvSpPr>
+            <a:spLocks noGrp="1"/>
+          </p:cNvSpPr>
+          <p:nvPr>
+            <p:ph type="sldNum" sz="quarter" idx="12"/>
+          </p:nvPr>
+        </p:nvSpPr>
+        <p:spPr/>
+        <p:txBody>
+          <a:bodyPr>
+            <a:normAutofit fontScale="85000" lnSpcReduction="20000"/>
+          </a:bodyPr>
+          <a:lstStyle/>
+          <a:p>
+            <a:fld id="{F2BF1754-4D2F-46D8-A35A-EF7FA01DA8F5}" type="slidenum">
+              <a:rPr lang="en-US" smtClean="0"/>
+              <a:pPr/>
+              <a:t>81</a:t>
+            </a:fld>
+            <a:endParaRPr lang="en-US" dirty="0"/>
+          </a:p>
+        </p:txBody>
+      </p:sp>
       <p:pic>
         <p:nvPicPr>
-          <p:cNvPr id="101378" name="Picture 2"/>
+          <p:cNvPr id="1026" name="Picture 2"/>
           <p:cNvPicPr>
             <a:picLocks noChangeAspect="1" noChangeArrowheads="1"/>
           </p:cNvPicPr>
           <p:nvPr/>
         </p:nvPicPr>
         <p:blipFill>
-          <a:blip r:embed="rId2" cstate="print"/>
+          <a:blip r:embed="rId3" cstate="print"/>
           <a:srcRect/>
           <a:stretch>
             <a:fillRect/>
@@ -27774,8 +28980,8 @@
         </p:blipFill>
         <p:spPr bwMode="auto">
           <a:xfrm>
-            <a:off x="1371600" y="2667000"/>
-            <a:ext cx="6248400" cy="3528325"/>
+            <a:off x="1219200" y="2667000"/>
+            <a:ext cx="6505575" cy="3573675"/>
           </a:xfrm>
           <a:prstGeom prst="rect">
             <a:avLst/>
@@ -27789,117 +28995,6 @@
           </a:ln>
         </p:spPr>
       </p:pic>
-      <p:sp>
-        <p:nvSpPr>
-          <p:cNvPr id="2" name="Title 1"/>
-          <p:cNvSpPr>
-            <a:spLocks noGrp="1"/>
-          </p:cNvSpPr>
-          <p:nvPr>
-            <p:ph type="title"/>
-          </p:nvPr>
-        </p:nvSpPr>
-        <p:spPr/>
-        <p:txBody>
-          <a:bodyPr/>
-          <a:lstStyle/>
-          <a:p>
-            <a:pPr algn="ctr"/>
-            <a:r>
-              <a:rPr lang="en-US" dirty="0" smtClean="0"/>
-              <a:t>Android Marketplace</a:t>
-            </a:r>
-            <a:endParaRPr lang="en-IN" dirty="0"/>
-          </a:p>
-        </p:txBody>
-      </p:sp>
-      <p:sp>
-        <p:nvSpPr>
-          <p:cNvPr id="3" name="Date Placeholder 2"/>
-          <p:cNvSpPr>
-            <a:spLocks noGrp="1"/>
-          </p:cNvSpPr>
-          <p:nvPr>
-            <p:ph type="dt" sz="half" idx="10"/>
-          </p:nvPr>
-        </p:nvSpPr>
-        <p:spPr/>
-        <p:txBody>
-          <a:bodyPr/>
-          <a:lstStyle/>
-          <a:p>
-            <a:r>
-              <a:rPr lang="en-US" smtClean="0"/>
-              <a:t>2011-2012</a:t>
-            </a:r>
-            <a:endParaRPr lang="en-US" dirty="0"/>
-          </a:p>
-        </p:txBody>
-      </p:sp>
-      <p:sp>
-        <p:nvSpPr>
-          <p:cNvPr id="4" name="Content Placeholder 3"/>
-          <p:cNvSpPr>
-            <a:spLocks noGrp="1"/>
-          </p:cNvSpPr>
-          <p:nvPr>
-            <p:ph sz="quarter" idx="1"/>
-          </p:nvPr>
-        </p:nvSpPr>
-        <p:spPr>
-          <a:xfrm>
-            <a:off x="612648" y="1600200"/>
-            <a:ext cx="8153400" cy="1066800"/>
-          </a:xfrm>
-        </p:spPr>
-        <p:txBody>
-          <a:bodyPr/>
-          <a:lstStyle/>
-          <a:p>
-            <a:r>
-              <a:rPr lang="en-US" dirty="0" smtClean="0"/>
-              <a:t>For the Publisher – Login and visit </a:t>
-            </a:r>
-            <a:r>
-              <a:rPr lang="en-US" dirty="0" smtClean="0">
-                <a:hlinkClick r:id="rId3"/>
-              </a:rPr>
-              <a:t>https://play.google.com/apps/publish/Home</a:t>
-            </a:r>
-            <a:r>
-              <a:rPr lang="en-US" dirty="0" smtClean="0"/>
-              <a:t> </a:t>
-            </a:r>
-            <a:endParaRPr lang="en-IN" dirty="0"/>
-          </a:p>
-        </p:txBody>
-      </p:sp>
-      <p:sp>
-        <p:nvSpPr>
-          <p:cNvPr id="5" name="Slide Number Placeholder 4"/>
-          <p:cNvSpPr>
-            <a:spLocks noGrp="1"/>
-          </p:cNvSpPr>
-          <p:nvPr>
-            <p:ph type="sldNum" sz="quarter" idx="12"/>
-          </p:nvPr>
-        </p:nvSpPr>
-        <p:spPr/>
-        <p:txBody>
-          <a:bodyPr>
-            <a:normAutofit fontScale="85000" lnSpcReduction="20000"/>
-          </a:bodyPr>
-          <a:lstStyle/>
-          <a:p>
-            <a:fld id="{F2BF1754-4D2F-46D8-A35A-EF7FA01DA8F5}" type="slidenum">
-              <a:rPr lang="en-US" smtClean="0"/>
-              <a:pPr/>
-              <a:t>81</a:t>
-            </a:fld>
-            <a:endParaRPr lang="en-US" dirty="0"/>
-          </a:p>
-        </p:txBody>
-      </p:sp>
     </p:spTree>
   </p:cSld>
   <p:clrMapOvr>
@@ -28410,15 +29505,12 @@
           </a:p>
           <a:p>
             <a:r>
-              <a:rPr lang="en-US" b="1" dirty="0" smtClean="0"/>
-              <a:t>Hands On Exercise : Build the APK : ex15.docx</a:t>
-            </a:r>
-            <a:endParaRPr lang="en-US" dirty="0" smtClean="0"/>
-          </a:p>
-          <a:p>
-            <a:r>
-              <a:rPr lang="en-US" dirty="0" smtClean="0"/>
-              <a:t>Provide 2 screenshots</a:t>
+              <a:rPr lang="en-US" dirty="0" smtClean="0"/>
+              <a:t>Provide </a:t>
+            </a:r>
+            <a:r>
+              <a:rPr lang="en-US" dirty="0" smtClean="0"/>
+              <a:t>2 screenshots</a:t>
             </a:r>
           </a:p>
           <a:p>
@@ -29244,11 +30336,7 @@
           <a:p>
             <a:r>
               <a:rPr lang="en-US" sz="1600" dirty="0" smtClean="0"/>
-              <a:t>October 1, </a:t>
-            </a:r>
-            <a:r>
-              <a:rPr lang="en-US" sz="1600" dirty="0" smtClean="0"/>
-              <a:t>2012 : </a:t>
+              <a:t>October 1, 2012 : </a:t>
             </a:r>
             <a:r>
               <a:rPr lang="en-IN" sz="1600" dirty="0" smtClean="0">
@@ -29417,11 +30505,7 @@
           <a:p>
             <a:r>
               <a:rPr lang="en-US" sz="3200" b="1" dirty="0" smtClean="0"/>
-              <a:t>~ </a:t>
-            </a:r>
-            <a:r>
-              <a:rPr lang="en-US" sz="3200" b="1" dirty="0" smtClean="0"/>
-              <a:t>72%</a:t>
+              <a:t>~ 72%</a:t>
             </a:r>
             <a:endParaRPr lang="en-IN" sz="3200" b="1" dirty="0"/>
           </a:p>
@@ -29451,11 +30535,7 @@
           <a:p>
             <a:r>
               <a:rPr lang="en-US" sz="3200" b="1" dirty="0" smtClean="0"/>
-              <a:t>~ </a:t>
-            </a:r>
-            <a:r>
-              <a:rPr lang="en-US" sz="3200" b="1" dirty="0" smtClean="0"/>
-              <a:t>25%</a:t>
+              <a:t>~ 25%</a:t>
             </a:r>
             <a:endParaRPr lang="en-IN" sz="3200" b="1" dirty="0"/>
           </a:p>

</xml_diff>